<commit_message>
Added request/response json slide
</commit_message>
<xml_diff>
--- a/docs/Introduction_To_Microservices_Part_1.pptx
+++ b/docs/Introduction_To_Microservices_Part_1.pptx
@@ -16,6 +16,8 @@
     <p:sldId id="265" r:id="rId10"/>
     <p:sldId id="269" r:id="rId11"/>
     <p:sldId id="271" r:id="rId12"/>
+    <p:sldId id="272" r:id="rId13"/>
+    <p:sldId id="273" r:id="rId14"/>
   </p:sldIdLst>
   <p:sldSz cx="12192000" cy="6858000"/>
   <p:notesSz cx="6858000" cy="9144000"/>
@@ -6112,6 +6114,373 @@
 </p:sld>
 </file>
 
+<file path=ppt/slides/slide12.xml><?xml version="1.0" encoding="utf-8"?>
+<p:sld xmlns:a="http://schemas.openxmlformats.org/drawingml/2006/main" xmlns:r="http://schemas.openxmlformats.org/officeDocument/2006/relationships" xmlns:p="http://schemas.openxmlformats.org/presentationml/2006/main">
+  <p:cSld>
+    <p:spTree>
+      <p:nvGrpSpPr>
+        <p:cNvPr id="1" name=""/>
+        <p:cNvGrpSpPr/>
+        <p:nvPr/>
+      </p:nvGrpSpPr>
+      <p:grpSpPr>
+        <a:xfrm>
+          <a:off x="0" y="0"/>
+          <a:ext cx="0" cy="0"/>
+          <a:chOff x="0" y="0"/>
+          <a:chExt cx="0" cy="0"/>
+        </a:xfrm>
+      </p:grpSpPr>
+      <p:sp>
+        <p:nvSpPr>
+          <p:cNvPr id="2" name="Title 1">
+            <a:extLst>
+              <a:ext uri="{FF2B5EF4-FFF2-40B4-BE49-F238E27FC236}">
+                <a16:creationId xmlns:a16="http://schemas.microsoft.com/office/drawing/2014/main" id="{86F52E70-9826-481B-A315-5B22F9D02955}"/>
+              </a:ext>
+            </a:extLst>
+          </p:cNvPr>
+          <p:cNvSpPr>
+            <a:spLocks noGrp="1"/>
+          </p:cNvSpPr>
+          <p:nvPr>
+            <p:ph type="title"/>
+          </p:nvPr>
+        </p:nvSpPr>
+        <p:spPr/>
+        <p:txBody>
+          <a:bodyPr/>
+          <a:lstStyle/>
+          <a:p>
+            <a:endParaRPr lang="pl-PL"/>
+          </a:p>
+        </p:txBody>
+      </p:sp>
+      <p:pic>
+        <p:nvPicPr>
+          <p:cNvPr id="4" name="Content Placeholder 3">
+            <a:extLst>
+              <a:ext uri="{FF2B5EF4-FFF2-40B4-BE49-F238E27FC236}">
+                <a16:creationId xmlns:a16="http://schemas.microsoft.com/office/drawing/2014/main" id="{06F1DB90-0E27-4D02-82B2-622E0AB5DAD9}"/>
+              </a:ext>
+            </a:extLst>
+          </p:cNvPr>
+          <p:cNvPicPr>
+            <a:picLocks noGrp="1" noChangeAspect="1"/>
+          </p:cNvPicPr>
+          <p:nvPr>
+            <p:ph idx="1"/>
+          </p:nvPr>
+        </p:nvPicPr>
+        <p:blipFill>
+          <a:blip r:embed="rId2"/>
+          <a:stretch>
+            <a:fillRect/>
+          </a:stretch>
+        </p:blipFill>
+        <p:spPr>
+          <a:xfrm>
+            <a:off x="5721635" y="2218461"/>
+            <a:ext cx="4944291" cy="3881437"/>
+          </a:xfrm>
+          <a:prstGeom prst="rect">
+            <a:avLst/>
+          </a:prstGeom>
+        </p:spPr>
+      </p:pic>
+      <p:sp>
+        <p:nvSpPr>
+          <p:cNvPr id="6" name="Rectangle 5">
+            <a:extLst>
+              <a:ext uri="{FF2B5EF4-FFF2-40B4-BE49-F238E27FC236}">
+                <a16:creationId xmlns:a16="http://schemas.microsoft.com/office/drawing/2014/main" id="{DFAB90F5-3004-4245-93FC-B04390459554}"/>
+              </a:ext>
+            </a:extLst>
+          </p:cNvPr>
+          <p:cNvSpPr/>
+          <p:nvPr/>
+        </p:nvSpPr>
+        <p:spPr>
+          <a:xfrm>
+            <a:off x="1873954" y="4930347"/>
+            <a:ext cx="3702757" cy="1169551"/>
+          </a:xfrm>
+          <a:prstGeom prst="rect">
+            <a:avLst/>
+          </a:prstGeom>
+        </p:spPr>
+        <p:txBody>
+          <a:bodyPr wrap="square">
+            <a:spAutoFit/>
+          </a:bodyPr>
+          <a:lstStyle/>
+          <a:p>
+            <a:br>
+              <a:rPr lang="pl-PL" sz="1400" dirty="0">
+                <a:latin typeface="Courier New" panose="02070309020205020404" pitchFamily="49" charset="0"/>
+                <a:cs typeface="Courier New" panose="02070309020205020404" pitchFamily="49" charset="0"/>
+              </a:rPr>
+            </a:br>
+            <a:r>
+              <a:rPr lang="pl-PL" sz="1400" dirty="0">
+                <a:solidFill>
+                  <a:srgbClr val="1A1A1A"/>
+                </a:solidFill>
+                <a:latin typeface="Courier New" panose="02070309020205020404" pitchFamily="49" charset="0"/>
+                <a:cs typeface="Courier New" panose="02070309020205020404" pitchFamily="49" charset="0"/>
+              </a:rPr>
+              <a:t>{"</a:t>
+            </a:r>
+            <a:r>
+              <a:rPr lang="pl-PL" sz="1400" dirty="0" err="1">
+                <a:solidFill>
+                  <a:srgbClr val="1A1A1A"/>
+                </a:solidFill>
+                <a:latin typeface="Courier New" panose="02070309020205020404" pitchFamily="49" charset="0"/>
+                <a:cs typeface="Courier New" panose="02070309020205020404" pitchFamily="49" charset="0"/>
+              </a:rPr>
+              <a:t>username</a:t>
+            </a:r>
+            <a:r>
+              <a:rPr lang="pl-PL" sz="1400" dirty="0">
+                <a:solidFill>
+                  <a:srgbClr val="1A1A1A"/>
+                </a:solidFill>
+                <a:latin typeface="Courier New" panose="02070309020205020404" pitchFamily="49" charset="0"/>
+                <a:cs typeface="Courier New" panose="02070309020205020404" pitchFamily="49" charset="0"/>
+              </a:rPr>
+              <a:t>":"</a:t>
+            </a:r>
+            <a:r>
+              <a:rPr lang="pl-PL" sz="1400" dirty="0" err="1">
+                <a:solidFill>
+                  <a:srgbClr val="1A1A1A"/>
+                </a:solidFill>
+                <a:latin typeface="Courier New" panose="02070309020205020404" pitchFamily="49" charset="0"/>
+                <a:cs typeface="Courier New" panose="02070309020205020404" pitchFamily="49" charset="0"/>
+              </a:rPr>
+              <a:t>testy_testerson</a:t>
+            </a:r>
+            <a:r>
+              <a:rPr lang="pl-PL" sz="1400" dirty="0">
+                <a:solidFill>
+                  <a:srgbClr val="1A1A1A"/>
+                </a:solidFill>
+                <a:latin typeface="Courier New" panose="02070309020205020404" pitchFamily="49" charset="0"/>
+                <a:cs typeface="Courier New" panose="02070309020205020404" pitchFamily="49" charset="0"/>
+              </a:rPr>
+              <a:t>", "</a:t>
+            </a:r>
+            <a:r>
+              <a:rPr lang="pl-PL" sz="1400" dirty="0" err="1">
+                <a:solidFill>
+                  <a:srgbClr val="1A1A1A"/>
+                </a:solidFill>
+                <a:latin typeface="Courier New" panose="02070309020205020404" pitchFamily="49" charset="0"/>
+                <a:cs typeface="Courier New" panose="02070309020205020404" pitchFamily="49" charset="0"/>
+              </a:rPr>
+              <a:t>password</a:t>
+            </a:r>
+            <a:r>
+              <a:rPr lang="pl-PL" sz="1400" dirty="0">
+                <a:solidFill>
+                  <a:srgbClr val="1A1A1A"/>
+                </a:solidFill>
+                <a:latin typeface="Courier New" panose="02070309020205020404" pitchFamily="49" charset="0"/>
+                <a:cs typeface="Courier New" panose="02070309020205020404" pitchFamily="49" charset="0"/>
+              </a:rPr>
+              <a:t>":"pa$$W0rd", "</a:t>
+            </a:r>
+            <a:r>
+              <a:rPr lang="pl-PL" sz="1400" dirty="0" err="1">
+                <a:solidFill>
+                  <a:srgbClr val="1A1A1A"/>
+                </a:solidFill>
+                <a:latin typeface="Courier New" panose="02070309020205020404" pitchFamily="49" charset="0"/>
+                <a:cs typeface="Courier New" panose="02070309020205020404" pitchFamily="49" charset="0"/>
+              </a:rPr>
+              <a:t>firstName</a:t>
+            </a:r>
+            <a:r>
+              <a:rPr lang="pl-PL" sz="1400" dirty="0">
+                <a:solidFill>
+                  <a:srgbClr val="1A1A1A"/>
+                </a:solidFill>
+                <a:latin typeface="Courier New" panose="02070309020205020404" pitchFamily="49" charset="0"/>
+                <a:cs typeface="Courier New" panose="02070309020205020404" pitchFamily="49" charset="0"/>
+              </a:rPr>
+              <a:t>":"Testy", "</a:t>
+            </a:r>
+            <a:r>
+              <a:rPr lang="pl-PL" sz="1400" dirty="0" err="1">
+                <a:solidFill>
+                  <a:srgbClr val="1A1A1A"/>
+                </a:solidFill>
+                <a:latin typeface="Courier New" panose="02070309020205020404" pitchFamily="49" charset="0"/>
+                <a:cs typeface="Courier New" panose="02070309020205020404" pitchFamily="49" charset="0"/>
+              </a:rPr>
+              <a:t>lastName</a:t>
+            </a:r>
+            <a:r>
+              <a:rPr lang="pl-PL" sz="1400" dirty="0">
+                <a:solidFill>
+                  <a:srgbClr val="1A1A1A"/>
+                </a:solidFill>
+                <a:latin typeface="Courier New" panose="02070309020205020404" pitchFamily="49" charset="0"/>
+                <a:cs typeface="Courier New" panose="02070309020205020404" pitchFamily="49" charset="0"/>
+              </a:rPr>
+              <a:t>":"</a:t>
+            </a:r>
+            <a:r>
+              <a:rPr lang="pl-PL" sz="1400" dirty="0" err="1">
+                <a:solidFill>
+                  <a:srgbClr val="1A1A1A"/>
+                </a:solidFill>
+                <a:latin typeface="Courier New" panose="02070309020205020404" pitchFamily="49" charset="0"/>
+                <a:cs typeface="Courier New" panose="02070309020205020404" pitchFamily="49" charset="0"/>
+              </a:rPr>
+              <a:t>Testerson</a:t>
+            </a:r>
+            <a:r>
+              <a:rPr lang="pl-PL" sz="1400" dirty="0">
+                <a:solidFill>
+                  <a:srgbClr val="1A1A1A"/>
+                </a:solidFill>
+                <a:latin typeface="Courier New" panose="02070309020205020404" pitchFamily="49" charset="0"/>
+                <a:cs typeface="Courier New" panose="02070309020205020404" pitchFamily="49" charset="0"/>
+              </a:rPr>
+              <a:t>"}</a:t>
+            </a:r>
+            <a:endParaRPr lang="pl-PL" sz="1400" dirty="0">
+              <a:latin typeface="Courier New" panose="02070309020205020404" pitchFamily="49" charset="0"/>
+              <a:cs typeface="Courier New" panose="02070309020205020404" pitchFamily="49" charset="0"/>
+            </a:endParaRPr>
+          </a:p>
+        </p:txBody>
+      </p:sp>
+    </p:spTree>
+    <p:extLst>
+      <p:ext uri="{BB962C8B-B14F-4D97-AF65-F5344CB8AC3E}">
+        <p14:creationId xmlns:p14="http://schemas.microsoft.com/office/powerpoint/2010/main" val="439255564"/>
+      </p:ext>
+    </p:extLst>
+  </p:cSld>
+  <p:clrMapOvr>
+    <a:masterClrMapping/>
+  </p:clrMapOvr>
+</p:sld>
+</file>
+
+<file path=ppt/slides/slide13.xml><?xml version="1.0" encoding="utf-8"?>
+<p:sld xmlns:a="http://schemas.openxmlformats.org/drawingml/2006/main" xmlns:r="http://schemas.openxmlformats.org/officeDocument/2006/relationships" xmlns:p="http://schemas.openxmlformats.org/presentationml/2006/main">
+  <p:cSld>
+    <p:spTree>
+      <p:nvGrpSpPr>
+        <p:cNvPr id="1" name=""/>
+        <p:cNvGrpSpPr/>
+        <p:nvPr/>
+      </p:nvGrpSpPr>
+      <p:grpSpPr>
+        <a:xfrm>
+          <a:off x="0" y="0"/>
+          <a:ext cx="0" cy="0"/>
+          <a:chOff x="0" y="0"/>
+          <a:chExt cx="0" cy="0"/>
+        </a:xfrm>
+      </p:grpSpPr>
+      <p:sp>
+        <p:nvSpPr>
+          <p:cNvPr id="2" name="Title 1">
+            <a:extLst>
+              <a:ext uri="{FF2B5EF4-FFF2-40B4-BE49-F238E27FC236}">
+                <a16:creationId xmlns:a16="http://schemas.microsoft.com/office/drawing/2014/main" id="{88C733BC-72B4-4B45-B96A-C22B34C7E740}"/>
+              </a:ext>
+            </a:extLst>
+          </p:cNvPr>
+          <p:cNvSpPr>
+            <a:spLocks noGrp="1"/>
+          </p:cNvSpPr>
+          <p:nvPr>
+            <p:ph type="title"/>
+          </p:nvPr>
+        </p:nvSpPr>
+        <p:spPr/>
+        <p:txBody>
+          <a:bodyPr/>
+          <a:lstStyle/>
+          <a:p>
+            <a:endParaRPr lang="pl-PL"/>
+          </a:p>
+        </p:txBody>
+      </p:sp>
+      <p:sp>
+        <p:nvSpPr>
+          <p:cNvPr id="3" name="Content Placeholder 2">
+            <a:extLst>
+              <a:ext uri="{FF2B5EF4-FFF2-40B4-BE49-F238E27FC236}">
+                <a16:creationId xmlns:a16="http://schemas.microsoft.com/office/drawing/2014/main" id="{B0F0C387-D85D-43D3-BFCB-E571EABE43EE}"/>
+              </a:ext>
+            </a:extLst>
+          </p:cNvPr>
+          <p:cNvSpPr>
+            <a:spLocks noGrp="1"/>
+          </p:cNvSpPr>
+          <p:nvPr>
+            <p:ph idx="1"/>
+          </p:nvPr>
+        </p:nvSpPr>
+        <p:spPr/>
+        <p:txBody>
+          <a:bodyPr/>
+          <a:lstStyle/>
+          <a:p>
+            <a:endParaRPr lang="pl-PL"/>
+          </a:p>
+        </p:txBody>
+      </p:sp>
+      <p:pic>
+        <p:nvPicPr>
+          <p:cNvPr id="4" name="Picture 3">
+            <a:extLst>
+              <a:ext uri="{FF2B5EF4-FFF2-40B4-BE49-F238E27FC236}">
+                <a16:creationId xmlns:a16="http://schemas.microsoft.com/office/drawing/2014/main" id="{EBBC8E67-32A8-49B2-805A-FDB753C97527}"/>
+              </a:ext>
+            </a:extLst>
+          </p:cNvPr>
+          <p:cNvPicPr>
+            <a:picLocks noChangeAspect="1"/>
+          </p:cNvPicPr>
+          <p:nvPr/>
+        </p:nvPicPr>
+        <p:blipFill>
+          <a:blip r:embed="rId2"/>
+          <a:stretch>
+            <a:fillRect/>
+          </a:stretch>
+        </p:blipFill>
+        <p:spPr>
+          <a:xfrm>
+            <a:off x="5781880" y="1270000"/>
+            <a:ext cx="5732786" cy="4370388"/>
+          </a:xfrm>
+          <a:prstGeom prst="rect">
+            <a:avLst/>
+          </a:prstGeom>
+        </p:spPr>
+      </p:pic>
+    </p:spTree>
+    <p:extLst>
+      <p:ext uri="{BB962C8B-B14F-4D97-AF65-F5344CB8AC3E}">
+        <p14:creationId xmlns:p14="http://schemas.microsoft.com/office/powerpoint/2010/main" val="206726761"/>
+      </p:ext>
+    </p:extLst>
+  </p:cSld>
+  <p:clrMapOvr>
+    <a:masterClrMapping/>
+  </p:clrMapOvr>
+</p:sld>
+</file>
+
 <file path=ppt/slides/slide2.xml><?xml version="1.0" encoding="utf-8"?>
 <p:sld xmlns:a="http://schemas.openxmlformats.org/drawingml/2006/main" xmlns:r="http://schemas.openxmlformats.org/officeDocument/2006/relationships" xmlns:p="http://schemas.openxmlformats.org/presentationml/2006/main">
   <p:cSld>

</xml_diff>